<commit_message>
Foram corrigidos alguns erros
</commit_message>
<xml_diff>
--- a/Trabalho_Pratico/Powerpoint_vNG.pptx
+++ b/Trabalho_Pratico/Powerpoint_vNG.pptx
@@ -8363,19 +8363,8 @@
                 <a:latin typeface="Times New Roman" panose="02020603050405020304" pitchFamily="18" charset="0"/>
                 <a:cs typeface="Times New Roman" panose="02020603050405020304" pitchFamily="18" charset="0"/>
               </a:rPr>
-              <a:t>- P</a:t>
-            </a:r>
-            <a:r>
-              <a:rPr lang="pt-PT" sz="4000" dirty="0" err="1">
-                <a:latin typeface="Times New Roman" panose="02020603050405020304" pitchFamily="18" charset="0"/>
-                <a:cs typeface="Times New Roman" panose="02020603050405020304" pitchFamily="18" charset="0"/>
-              </a:rPr>
-              <a:t>re-processing</a:t>
-            </a:r>
-            <a:endParaRPr lang="pt-PT" sz="4000" dirty="0">
-              <a:latin typeface="Times New Roman" panose="02020603050405020304" pitchFamily="18" charset="0"/>
-              <a:cs typeface="Times New Roman" panose="02020603050405020304" pitchFamily="18" charset="0"/>
-            </a:endParaRPr>
+              <a:t>- Pre-processing</a:t>
+            </a:r>
           </a:p>
         </p:txBody>
       </p:sp>
@@ -8473,54 +8462,10 @@
           <a:lstStyle/>
           <a:p>
             <a:r>
-              <a:rPr lang="pt-PT" sz="2400" dirty="0" err="1"/>
-              <a:t>Feature</a:t>
-            </a:r>
-            <a:r>
-              <a:rPr lang="pt-PT" sz="2400" dirty="0"/>
-              <a:t> </a:t>
-            </a:r>
-            <a:r>
-              <a:rPr lang="pt-PT" sz="2400" dirty="0" err="1"/>
-              <a:t>Selection</a:t>
-            </a:r>
-            <a:r>
-              <a:rPr lang="pt-PT" sz="2400" dirty="0"/>
-              <a:t> / Feature </a:t>
-            </a:r>
-            <a:r>
-              <a:rPr lang="pt-PT" sz="2400" dirty="0" err="1"/>
-              <a:t>Reduction</a:t>
-            </a:r>
-            <a:r>
-              <a:rPr lang="pt-PT" sz="2400" dirty="0"/>
-              <a:t> </a:t>
-            </a:r>
-            <a:r>
-              <a:rPr lang="pt-PT" sz="2400" dirty="0" err="1"/>
-              <a:t>with</a:t>
-            </a:r>
-            <a:r>
-              <a:rPr lang="pt-PT" sz="2400" dirty="0"/>
-              <a:t> 95% </a:t>
-            </a:r>
-            <a:r>
-              <a:rPr lang="pt-PT" sz="2400" dirty="0" err="1"/>
-              <a:t>variance</a:t>
-            </a:r>
-            <a:r>
-              <a:rPr lang="pt-PT" sz="2400" dirty="0"/>
-              <a:t> </a:t>
-            </a:r>
-            <a:r>
-              <a:rPr lang="pt-PT" sz="2400" dirty="0" err="1"/>
-              <a:t>of</a:t>
-            </a:r>
-            <a:r>
-              <a:rPr lang="pt-PT" sz="2400" dirty="0"/>
-              <a:t> original data</a:t>
-            </a:r>
-            <a:endParaRPr lang="pt-PT" sz="2000" dirty="0"/>
+              <a:rPr lang="en-US" sz="2400" dirty="0"/>
+              <a:t>Feature Selection / Feature Reduction with 95% variance of original data</a:t>
+            </a:r>
+            <a:endParaRPr lang="en-US" sz="2000" dirty="0"/>
           </a:p>
         </p:txBody>
       </p:sp>
@@ -8929,42 +8874,10 @@
               </a:rPr>
             </a:br>
             <a:r>
-              <a:rPr lang="pt-PT" sz="4400" dirty="0" err="1"/>
-              <a:t>Discretization</a:t>
-            </a:r>
-            <a:r>
-              <a:rPr lang="pt-PT" sz="4400" dirty="0"/>
-              <a:t> </a:t>
-            </a:r>
-            <a:r>
-              <a:rPr lang="pt-PT" sz="4400" dirty="0" err="1"/>
-              <a:t>with</a:t>
-            </a:r>
-            <a:r>
-              <a:rPr lang="pt-PT" sz="4400" dirty="0"/>
-              <a:t> </a:t>
-            </a:r>
-            <a:r>
-              <a:rPr lang="pt-PT" sz="4400" dirty="0" err="1"/>
-              <a:t>Equal</a:t>
-            </a:r>
-            <a:r>
-              <a:rPr lang="pt-PT" sz="4400" dirty="0"/>
-              <a:t> </a:t>
-            </a:r>
-            <a:r>
-              <a:rPr lang="pt-PT" sz="4400" dirty="0" err="1"/>
-              <a:t>Frequency</a:t>
-            </a:r>
-            <a:r>
-              <a:rPr lang="pt-PT" sz="4400" dirty="0"/>
-              <a:t> </a:t>
-            </a:r>
-            <a:r>
-              <a:rPr lang="pt-PT" sz="4400" dirty="0" err="1"/>
-              <a:t>Binning</a:t>
-            </a:r>
-            <a:endParaRPr lang="pt-PT" b="1" dirty="0">
+              <a:rPr lang="en-US" sz="4400" dirty="0"/>
+              <a:t>Discretization with Equal Frequency Binning</a:t>
+            </a:r>
+            <a:endParaRPr lang="en-US" b="1" dirty="0">
               <a:latin typeface="Times New Roman" panose="02020603050405020304" pitchFamily="18" charset="0"/>
               <a:ea typeface="MS Mincho" panose="02020609040205080304" pitchFamily="49" charset="-128"/>
             </a:endParaRPr>
@@ -9151,83 +9064,28 @@
           <a:lstStyle/>
           <a:p>
             <a:r>
-              <a:rPr lang="pt-PT" b="1" dirty="0" err="1">
+              <a:rPr lang="en-US" b="1" dirty="0">
                 <a:latin typeface="Times New Roman" panose="02020603050405020304" pitchFamily="18" charset="0"/>
                 <a:ea typeface="MS Mincho" panose="02020609040205080304" pitchFamily="49" charset="-128"/>
               </a:rPr>
-              <a:t>Answer</a:t>
-            </a:r>
-            <a:r>
-              <a:rPr lang="pt-PT" b="1" dirty="0">
-                <a:latin typeface="Times New Roman" panose="02020603050405020304" pitchFamily="18" charset="0"/>
-                <a:ea typeface="MS Mincho" panose="02020609040205080304" pitchFamily="49" charset="-128"/>
-              </a:rPr>
-              <a:t> to Question 1 </a:t>
+              <a:t>Answer to Question 1 </a:t>
             </a:r>
             <a:br>
-              <a:rPr lang="pt-PT" sz="3600" dirty="0">
+              <a:rPr lang="en-US" sz="3600" dirty="0">
                 <a:latin typeface="Tahoma" panose="020B0604030504040204" pitchFamily="34" charset="0"/>
                 <a:ea typeface="Tahoma" panose="020B0604030504040204" pitchFamily="34" charset="0"/>
                 <a:cs typeface="Tahoma" panose="020B0604030504040204" pitchFamily="34" charset="0"/>
               </a:rPr>
             </a:br>
             <a:r>
-              <a:rPr lang="pt-PT" sz="3200" dirty="0" err="1">
+              <a:rPr lang="en-US" sz="3200" dirty="0">
                 <a:latin typeface="Tahoma" panose="020B0604030504040204" pitchFamily="34" charset="0"/>
                 <a:ea typeface="Tahoma" panose="020B0604030504040204" pitchFamily="34" charset="0"/>
                 <a:cs typeface="Tahoma" panose="020B0604030504040204" pitchFamily="34" charset="0"/>
               </a:rPr>
-              <a:t>Classifying</a:t>
-            </a:r>
-            <a:r>
-              <a:rPr lang="pt-PT" sz="3200" dirty="0">
-                <a:latin typeface="Tahoma" panose="020B0604030504040204" pitchFamily="34" charset="0"/>
-                <a:ea typeface="Tahoma" panose="020B0604030504040204" pitchFamily="34" charset="0"/>
-                <a:cs typeface="Tahoma" panose="020B0604030504040204" pitchFamily="34" charset="0"/>
-              </a:rPr>
-              <a:t> a Zip </a:t>
-            </a:r>
-            <a:r>
-              <a:rPr lang="pt-PT" sz="3200" dirty="0" err="1">
-                <a:latin typeface="Tahoma" panose="020B0604030504040204" pitchFamily="34" charset="0"/>
-                <a:ea typeface="Tahoma" panose="020B0604030504040204" pitchFamily="34" charset="0"/>
-                <a:cs typeface="Tahoma" panose="020B0604030504040204" pitchFamily="34" charset="0"/>
-              </a:rPr>
-              <a:t>Code</a:t>
-            </a:r>
-            <a:r>
-              <a:rPr lang="pt-PT" sz="3200" dirty="0">
-                <a:latin typeface="Tahoma" panose="020B0604030504040204" pitchFamily="34" charset="0"/>
-                <a:ea typeface="Tahoma" panose="020B0604030504040204" pitchFamily="34" charset="0"/>
-                <a:cs typeface="Tahoma" panose="020B0604030504040204" pitchFamily="34" charset="0"/>
-              </a:rPr>
-              <a:t> as Industrial </a:t>
-            </a:r>
-            <a:r>
-              <a:rPr lang="pt-PT" sz="3200" dirty="0" err="1">
-                <a:latin typeface="Tahoma" panose="020B0604030504040204" pitchFamily="34" charset="0"/>
-                <a:ea typeface="Tahoma" panose="020B0604030504040204" pitchFamily="34" charset="0"/>
-                <a:cs typeface="Tahoma" panose="020B0604030504040204" pitchFamily="34" charset="0"/>
-              </a:rPr>
-              <a:t>or</a:t>
-            </a:r>
-            <a:r>
-              <a:rPr lang="pt-PT" sz="3200" dirty="0">
-                <a:latin typeface="Tahoma" panose="020B0604030504040204" pitchFamily="34" charset="0"/>
-                <a:ea typeface="Tahoma" panose="020B0604030504040204" pitchFamily="34" charset="0"/>
-                <a:cs typeface="Tahoma" panose="020B0604030504040204" pitchFamily="34" charset="0"/>
-              </a:rPr>
-              <a:t> </a:t>
-            </a:r>
-            <a:r>
-              <a:rPr lang="pt-PT" sz="3200" dirty="0" err="1">
-                <a:latin typeface="Tahoma" panose="020B0604030504040204" pitchFamily="34" charset="0"/>
-                <a:ea typeface="Tahoma" panose="020B0604030504040204" pitchFamily="34" charset="0"/>
-                <a:cs typeface="Tahoma" panose="020B0604030504040204" pitchFamily="34" charset="0"/>
-              </a:rPr>
-              <a:t>Residential</a:t>
-            </a:r>
-            <a:endParaRPr lang="pt-PT" sz="3600" dirty="0">
+              <a:t>Classifying a Zip Code as Industrial or Residential</a:t>
+            </a:r>
+            <a:endParaRPr lang="en-US" sz="3600" dirty="0">
               <a:latin typeface="Tahoma" panose="020B0604030504040204" pitchFamily="34" charset="0"/>
               <a:ea typeface="Tahoma" panose="020B0604030504040204" pitchFamily="34" charset="0"/>
               <a:cs typeface="Tahoma" panose="020B0604030504040204" pitchFamily="34" charset="0"/>
@@ -9368,50 +9226,9 @@
               </a:lnSpc>
             </a:pPr>
             <a:r>
-              <a:rPr lang="pt-PT" sz="2400" dirty="0" err="1"/>
-              <a:t>Best</a:t>
-            </a:r>
-            <a:r>
-              <a:rPr lang="pt-PT" sz="2400" dirty="0"/>
-              <a:t> </a:t>
-            </a:r>
-            <a:r>
-              <a:rPr lang="pt-PT" sz="2400" dirty="0" err="1"/>
-              <a:t>results</a:t>
-            </a:r>
-            <a:r>
-              <a:rPr lang="pt-PT" sz="2400" dirty="0"/>
-              <a:t> for </a:t>
-            </a:r>
-            <a:r>
-              <a:rPr lang="pt-PT" sz="2400" dirty="0" err="1"/>
-              <a:t>Decision</a:t>
-            </a:r>
-            <a:r>
-              <a:rPr lang="pt-PT" sz="2400" dirty="0"/>
-              <a:t> </a:t>
-            </a:r>
-            <a:r>
-              <a:rPr lang="pt-PT" sz="2400" dirty="0" err="1"/>
-              <a:t>Trees</a:t>
-            </a:r>
-            <a:r>
-              <a:rPr lang="pt-PT" sz="2400" dirty="0"/>
-              <a:t>, performance to </a:t>
-            </a:r>
-            <a:r>
-              <a:rPr lang="pt-PT" sz="2400" dirty="0" err="1"/>
-              <a:t>be</a:t>
-            </a:r>
-            <a:r>
-              <a:rPr lang="pt-PT" sz="2400" dirty="0"/>
-              <a:t> </a:t>
-            </a:r>
-            <a:r>
-              <a:rPr lang="pt-PT" sz="2400" dirty="0" err="1"/>
-              <a:t>investigated</a:t>
-            </a:r>
-            <a:endParaRPr lang="pt-PT" sz="2400" dirty="0"/>
+              <a:rPr lang="en-US" sz="2400" dirty="0"/>
+              <a:t>Best results for Decision Trees, performance to be investigated</a:t>
+            </a:r>
           </a:p>
           <a:p>
             <a:pPr>
@@ -9420,34 +9237,9 @@
               </a:lnSpc>
             </a:pPr>
             <a:r>
-              <a:rPr lang="pt-PT" sz="2400" dirty="0" err="1"/>
-              <a:t>Logistic</a:t>
-            </a:r>
-            <a:r>
-              <a:rPr lang="pt-PT" sz="2400" dirty="0"/>
-              <a:t> </a:t>
-            </a:r>
-            <a:r>
-              <a:rPr lang="pt-PT" sz="2400" dirty="0" err="1"/>
-              <a:t>Regression</a:t>
-            </a:r>
-            <a:r>
-              <a:rPr lang="pt-PT" sz="2400" dirty="0"/>
-              <a:t> displays </a:t>
-            </a:r>
-            <a:r>
-              <a:rPr lang="pt-PT" sz="2400" dirty="0" err="1"/>
-              <a:t>worst</a:t>
-            </a:r>
-            <a:r>
-              <a:rPr lang="pt-PT" sz="2400" dirty="0"/>
-              <a:t> performance </a:t>
-            </a:r>
-            <a:r>
-              <a:rPr lang="pt-PT" sz="2400" dirty="0" err="1"/>
-              <a:t>overall</a:t>
-            </a:r>
-            <a:endParaRPr lang="pt-PT" sz="2400" dirty="0"/>
+              <a:rPr lang="en-US" sz="2400" dirty="0"/>
+              <a:t>Logistic Regression displays worst performance overall</a:t>
+            </a:r>
           </a:p>
           <a:p>
             <a:pPr>
@@ -9456,34 +9248,9 @@
               </a:lnSpc>
             </a:pPr>
             <a:r>
-              <a:rPr lang="pt-PT" sz="2400" dirty="0" err="1"/>
-              <a:t>Oversampling</a:t>
-            </a:r>
-            <a:r>
-              <a:rPr lang="pt-PT" sz="2400" dirty="0"/>
-              <a:t> </a:t>
-            </a:r>
-            <a:r>
-              <a:rPr lang="pt-PT" sz="2400" dirty="0" err="1"/>
-              <a:t>gets</a:t>
-            </a:r>
-            <a:r>
-              <a:rPr lang="pt-PT" sz="2400" dirty="0"/>
-              <a:t> the </a:t>
-            </a:r>
-            <a:r>
-              <a:rPr lang="pt-PT" sz="2400" dirty="0" err="1"/>
-              <a:t>best</a:t>
-            </a:r>
-            <a:r>
-              <a:rPr lang="pt-PT" sz="2400" dirty="0"/>
-              <a:t> </a:t>
-            </a:r>
-            <a:r>
-              <a:rPr lang="pt-PT" sz="2400" dirty="0" err="1"/>
-              <a:t>results</a:t>
-            </a:r>
-            <a:endParaRPr lang="pt-PT" sz="2400" dirty="0"/>
+              <a:rPr lang="en-US" sz="2400" dirty="0"/>
+              <a:t>Oversampling gets the best results</a:t>
+            </a:r>
           </a:p>
           <a:p>
             <a:pPr>
@@ -9492,54 +9259,9 @@
               </a:lnSpc>
             </a:pPr>
             <a:r>
-              <a:rPr lang="pt-PT" sz="2400" dirty="0"/>
-              <a:t>Random </a:t>
-            </a:r>
-            <a:r>
-              <a:rPr lang="pt-PT" sz="2400" dirty="0" err="1"/>
-              <a:t>seed</a:t>
-            </a:r>
-            <a:r>
-              <a:rPr lang="pt-PT" sz="2400" dirty="0"/>
-              <a:t> </a:t>
-            </a:r>
-            <a:r>
-              <a:rPr lang="pt-PT" sz="2400" dirty="0" err="1"/>
-              <a:t>influences</a:t>
-            </a:r>
-            <a:r>
-              <a:rPr lang="pt-PT" sz="2400" dirty="0"/>
-              <a:t> Random </a:t>
-            </a:r>
-            <a:r>
-              <a:rPr lang="pt-PT" sz="2400" dirty="0" err="1"/>
-              <a:t>Forest</a:t>
-            </a:r>
-            <a:r>
-              <a:rPr lang="pt-PT" sz="2400" dirty="0"/>
-              <a:t> </a:t>
-            </a:r>
-            <a:r>
-              <a:rPr lang="pt-PT" sz="2400" dirty="0" err="1"/>
-              <a:t>and</a:t>
-            </a:r>
-            <a:r>
-              <a:rPr lang="pt-PT" sz="2400" dirty="0"/>
-              <a:t> </a:t>
-            </a:r>
-            <a:r>
-              <a:rPr lang="pt-PT" sz="2400" dirty="0" err="1"/>
-              <a:t>Logistic</a:t>
-            </a:r>
-            <a:r>
-              <a:rPr lang="pt-PT" sz="2400" dirty="0"/>
-              <a:t> </a:t>
-            </a:r>
-            <a:r>
-              <a:rPr lang="pt-PT" sz="2400" dirty="0" err="1"/>
-              <a:t>Regression</a:t>
-            </a:r>
-            <a:endParaRPr lang="pt-PT" sz="2400" dirty="0"/>
+              <a:rPr lang="en-US" sz="2400" dirty="0"/>
+              <a:t>Random seed influences Random Forest and Logistic Regression</a:t>
+            </a:r>
           </a:p>
         </p:txBody>
       </p:sp>
@@ -9679,86 +9401,26 @@
           <a:lstStyle/>
           <a:p>
             <a:r>
-              <a:rPr lang="pt-PT" b="1" dirty="0" err="1">
+              <a:rPr lang="en-US" b="1" dirty="0">
                 <a:latin typeface="Times New Roman" panose="02020603050405020304" pitchFamily="18" charset="0"/>
                 <a:ea typeface="MS Mincho" panose="02020609040205080304" pitchFamily="49" charset="-128"/>
               </a:rPr>
-              <a:t>Answer</a:t>
-            </a:r>
-            <a:r>
-              <a:rPr lang="pt-PT" b="1" dirty="0">
-                <a:latin typeface="Times New Roman" panose="02020603050405020304" pitchFamily="18" charset="0"/>
-                <a:ea typeface="MS Mincho" panose="02020609040205080304" pitchFamily="49" charset="-128"/>
-              </a:rPr>
-              <a:t> to Question 2 </a:t>
+              <a:t>Answer to Question 2 </a:t>
             </a:r>
             <a:br>
-              <a:rPr lang="pt-PT" b="1" dirty="0">
+              <a:rPr lang="en-US" b="1" dirty="0">
                 <a:latin typeface="Times New Roman" panose="02020603050405020304" pitchFamily="18" charset="0"/>
                 <a:ea typeface="MS Mincho" panose="02020609040205080304" pitchFamily="49" charset="-128"/>
               </a:rPr>
             </a:br>
             <a:r>
-              <a:rPr lang="pt-PT" sz="3600" dirty="0" err="1">
+              <a:rPr lang="en-US" sz="3600" dirty="0">
                 <a:latin typeface="Tahoma" panose="020B0604030504040204" pitchFamily="34" charset="0"/>
                 <a:ea typeface="Tahoma" panose="020B0604030504040204" pitchFamily="34" charset="0"/>
                 <a:cs typeface="Tahoma" panose="020B0604030504040204" pitchFamily="34" charset="0"/>
               </a:rPr>
-              <a:t>Predicting</a:t>
-            </a:r>
-            <a:r>
-              <a:rPr lang="pt-PT" sz="3600" dirty="0">
-                <a:latin typeface="Tahoma" panose="020B0604030504040204" pitchFamily="34" charset="0"/>
-                <a:ea typeface="Tahoma" panose="020B0604030504040204" pitchFamily="34" charset="0"/>
-                <a:cs typeface="Tahoma" panose="020B0604030504040204" pitchFamily="34" charset="0"/>
-              </a:rPr>
-              <a:t> </a:t>
-            </a:r>
-            <a:r>
-              <a:rPr lang="pt-PT" sz="3600" dirty="0" err="1">
-                <a:latin typeface="Tahoma" panose="020B0604030504040204" pitchFamily="34" charset="0"/>
-                <a:ea typeface="Tahoma" panose="020B0604030504040204" pitchFamily="34" charset="0"/>
-                <a:cs typeface="Tahoma" panose="020B0604030504040204" pitchFamily="34" charset="0"/>
-              </a:rPr>
-              <a:t>energetic</a:t>
-            </a:r>
-            <a:r>
-              <a:rPr lang="pt-PT" sz="3600" dirty="0">
-                <a:latin typeface="Tahoma" panose="020B0604030504040204" pitchFamily="34" charset="0"/>
-                <a:ea typeface="Tahoma" panose="020B0604030504040204" pitchFamily="34" charset="0"/>
-                <a:cs typeface="Tahoma" panose="020B0604030504040204" pitchFamily="34" charset="0"/>
-              </a:rPr>
-              <a:t> </a:t>
-            </a:r>
-            <a:r>
-              <a:rPr lang="pt-PT" sz="3600" dirty="0" err="1">
-                <a:latin typeface="Tahoma" panose="020B0604030504040204" pitchFamily="34" charset="0"/>
-                <a:ea typeface="Tahoma" panose="020B0604030504040204" pitchFamily="34" charset="0"/>
-                <a:cs typeface="Tahoma" panose="020B0604030504040204" pitchFamily="34" charset="0"/>
-              </a:rPr>
-              <a:t>consumption</a:t>
-            </a:r>
-            <a:r>
-              <a:rPr lang="pt-PT" sz="3600" dirty="0">
-                <a:latin typeface="Tahoma" panose="020B0604030504040204" pitchFamily="34" charset="0"/>
-                <a:ea typeface="Tahoma" panose="020B0604030504040204" pitchFamily="34" charset="0"/>
-                <a:cs typeface="Tahoma" panose="020B0604030504040204" pitchFamily="34" charset="0"/>
-              </a:rPr>
-              <a:t> in </a:t>
-            </a:r>
-            <a:r>
-              <a:rPr lang="pt-PT" sz="3600" dirty="0" err="1">
-                <a:latin typeface="Tahoma" panose="020B0604030504040204" pitchFamily="34" charset="0"/>
-                <a:ea typeface="Tahoma" panose="020B0604030504040204" pitchFamily="34" charset="0"/>
-                <a:cs typeface="Tahoma" panose="020B0604030504040204" pitchFamily="34" charset="0"/>
-              </a:rPr>
-              <a:t>Lisbon</a:t>
-            </a:r>
-            <a:endParaRPr lang="pt-PT" sz="3600" dirty="0">
-              <a:latin typeface="Tahoma" panose="020B0604030504040204" pitchFamily="34" charset="0"/>
-              <a:ea typeface="Tahoma" panose="020B0604030504040204" pitchFamily="34" charset="0"/>
-              <a:cs typeface="Tahoma" panose="020B0604030504040204" pitchFamily="34" charset="0"/>
-            </a:endParaRPr>
+              <a:t>Predicting energetic consumption in Lisbon</a:t>
+            </a:r>
           </a:p>
         </p:txBody>
       </p:sp>
@@ -9886,120 +9548,29 @@
           <a:lstStyle/>
           <a:p>
             <a:r>
-              <a:rPr lang="pt-PT" sz="2400" dirty="0" err="1"/>
-              <a:t>Best</a:t>
-            </a:r>
-            <a:r>
-              <a:rPr lang="pt-PT" sz="2400" dirty="0"/>
-              <a:t> </a:t>
-            </a:r>
-            <a:r>
-              <a:rPr lang="pt-PT" sz="2400" dirty="0" err="1"/>
-              <a:t>results</a:t>
-            </a:r>
-            <a:r>
-              <a:rPr lang="pt-PT" sz="2400" dirty="0"/>
-              <a:t> for </a:t>
-            </a:r>
-            <a:r>
-              <a:rPr lang="pt-PT" sz="2400" dirty="0" err="1"/>
-              <a:t>Gradient</a:t>
-            </a:r>
-            <a:r>
-              <a:rPr lang="pt-PT" sz="2400" dirty="0"/>
-              <a:t> </a:t>
-            </a:r>
-            <a:r>
-              <a:rPr lang="pt-PT" sz="2400" dirty="0" err="1"/>
-              <a:t>Boosted</a:t>
-            </a:r>
-            <a:r>
-              <a:rPr lang="pt-PT" sz="2400" dirty="0"/>
-              <a:t> </a:t>
-            </a:r>
-            <a:r>
-              <a:rPr lang="pt-PT" sz="2400" dirty="0" err="1"/>
-              <a:t>Trees</a:t>
-            </a:r>
-            <a:endParaRPr lang="pt-PT" sz="2400" dirty="0"/>
-          </a:p>
-          <a:p>
-            <a:r>
-              <a:rPr lang="pt-PT" sz="2400" dirty="0" err="1"/>
-              <a:t>Simplest</a:t>
-            </a:r>
-            <a:r>
-              <a:rPr lang="pt-PT" sz="2400" dirty="0"/>
-              <a:t> </a:t>
-            </a:r>
-            <a:r>
-              <a:rPr lang="pt-PT" sz="2400" dirty="0" err="1"/>
-              <a:t>model</a:t>
-            </a:r>
-            <a:r>
-              <a:rPr lang="pt-PT" sz="2400" dirty="0"/>
-              <a:t> (Linear </a:t>
-            </a:r>
-            <a:r>
-              <a:rPr lang="pt-PT" sz="2400" dirty="0" err="1"/>
-              <a:t>Regression</a:t>
-            </a:r>
-            <a:r>
-              <a:rPr lang="pt-PT" sz="2400" dirty="0"/>
-              <a:t>) </a:t>
-            </a:r>
-            <a:r>
-              <a:rPr lang="pt-PT" sz="2400" dirty="0" err="1"/>
-              <a:t>is</a:t>
-            </a:r>
-            <a:r>
-              <a:rPr lang="pt-PT" sz="2400" dirty="0"/>
-              <a:t> the </a:t>
-            </a:r>
-            <a:r>
-              <a:rPr lang="pt-PT" sz="2400" dirty="0" err="1"/>
-              <a:t>worst</a:t>
-            </a:r>
-            <a:endParaRPr lang="pt-PT" sz="2400" dirty="0"/>
-          </a:p>
-          <a:p>
-            <a:r>
-              <a:rPr lang="pt-PT" sz="2400" dirty="0" err="1"/>
-              <a:t>Oversampling</a:t>
-            </a:r>
-            <a:r>
-              <a:rPr lang="pt-PT" sz="2400" dirty="0"/>
-              <a:t> </a:t>
-            </a:r>
-            <a:r>
-              <a:rPr lang="pt-PT" sz="2400" dirty="0" err="1"/>
-              <a:t>and</a:t>
-            </a:r>
-            <a:r>
-              <a:rPr lang="pt-PT" sz="2400" dirty="0"/>
-              <a:t> </a:t>
-            </a:r>
-            <a:r>
-              <a:rPr lang="pt-PT" sz="2400" dirty="0" err="1"/>
+              <a:rPr lang="en-US" sz="2400" dirty="0"/>
+              <a:t>Best results for Gradient Boosted Trees</a:t>
+            </a:r>
+          </a:p>
+          <a:p>
+            <a:r>
+              <a:rPr lang="en-US" sz="2400" dirty="0"/>
+              <a:t>Simplest model (Linear Regression) is the worst</a:t>
+            </a:r>
+          </a:p>
+          <a:p>
+            <a:r>
+              <a:rPr lang="en-US" sz="2400" dirty="0"/>
+              <a:t>Oversampling and </a:t>
+            </a:r>
+            <a:r>
+              <a:rPr lang="en-US" sz="2400" dirty="0" err="1"/>
               <a:t>undersampling</a:t>
             </a:r>
             <a:r>
-              <a:rPr lang="pt-PT" sz="2400" dirty="0"/>
-              <a:t> </a:t>
-            </a:r>
-            <a:r>
-              <a:rPr lang="pt-PT" sz="2400" dirty="0" err="1"/>
-              <a:t>distort</a:t>
-            </a:r>
-            <a:r>
-              <a:rPr lang="pt-PT" sz="2400" dirty="0"/>
-              <a:t> the </a:t>
-            </a:r>
-            <a:r>
-              <a:rPr lang="pt-PT" sz="2400" dirty="0" err="1"/>
-              <a:t>dataset</a:t>
-            </a:r>
-            <a:endParaRPr lang="pt-PT" sz="2400" dirty="0"/>
+              <a:rPr lang="en-US" sz="2400" dirty="0"/>
+              <a:t> distort the dataset</a:t>
+            </a:r>
           </a:p>
         </p:txBody>
       </p:sp>
@@ -10307,36 +9878,12 @@
           </a:lstStyle>
           <a:p>
             <a:r>
-              <a:rPr lang="pt-PT" sz="4000" dirty="0" err="1">
+              <a:rPr lang="en-US" sz="4000" dirty="0">
                 <a:latin typeface="Tahoma" panose="020B0604030504040204" pitchFamily="34" charset="0"/>
                 <a:ea typeface="Tahoma" panose="020B0604030504040204" pitchFamily="34" charset="0"/>
                 <a:cs typeface="Tahoma" panose="020B0604030504040204" pitchFamily="34" charset="0"/>
               </a:rPr>
-              <a:t>Any</a:t>
-            </a:r>
-            <a:r>
-              <a:rPr lang="pt-PT" sz="4000" dirty="0">
-                <a:latin typeface="Tahoma" panose="020B0604030504040204" pitchFamily="34" charset="0"/>
-                <a:ea typeface="Tahoma" panose="020B0604030504040204" pitchFamily="34" charset="0"/>
-                <a:cs typeface="Tahoma" panose="020B0604030504040204" pitchFamily="34" charset="0"/>
-              </a:rPr>
-              <a:t> </a:t>
-            </a:r>
-            <a:r>
-              <a:rPr lang="pt-PT" sz="4000" dirty="0" err="1">
-                <a:latin typeface="Tahoma" panose="020B0604030504040204" pitchFamily="34" charset="0"/>
-                <a:ea typeface="Tahoma" panose="020B0604030504040204" pitchFamily="34" charset="0"/>
-                <a:cs typeface="Tahoma" panose="020B0604030504040204" pitchFamily="34" charset="0"/>
-              </a:rPr>
-              <a:t>questions</a:t>
-            </a:r>
-            <a:r>
-              <a:rPr lang="pt-PT" sz="4000" dirty="0">
-                <a:latin typeface="Tahoma" panose="020B0604030504040204" pitchFamily="34" charset="0"/>
-                <a:ea typeface="Tahoma" panose="020B0604030504040204" pitchFamily="34" charset="0"/>
-                <a:cs typeface="Tahoma" panose="020B0604030504040204" pitchFamily="34" charset="0"/>
-              </a:rPr>
-              <a:t>?</a:t>
+              <a:t>Any questions?</a:t>
             </a:r>
           </a:p>
         </p:txBody>
@@ -11107,20 +10654,13 @@
           <a:lstStyle/>
           <a:p>
             <a:r>
-              <a:rPr lang="pt-PT" b="1" dirty="0">
+              <a:rPr lang="en-US" b="1" dirty="0">
                 <a:latin typeface="Times New Roman" panose="02020603050405020304" pitchFamily="18" charset="0"/>
                 <a:ea typeface="MS Mincho" panose="02020609040205080304" pitchFamily="49" charset="-128"/>
               </a:rPr>
-              <a:t>Data </a:t>
-            </a:r>
-            <a:r>
-              <a:rPr lang="pt-PT" b="1" dirty="0" err="1">
-                <a:latin typeface="Times New Roman" panose="02020603050405020304" pitchFamily="18" charset="0"/>
-                <a:ea typeface="MS Mincho" panose="02020609040205080304" pitchFamily="49" charset="-128"/>
-              </a:rPr>
-              <a:t>Analysis</a:t>
-            </a:r>
-            <a:endParaRPr lang="pt-PT" dirty="0"/>
+              <a:t>Data Analysis</a:t>
+            </a:r>
+            <a:endParaRPr lang="en-US" dirty="0"/>
           </a:p>
         </p:txBody>
       </p:sp>
@@ -11369,34 +10909,13 @@
           <a:lstStyle/>
           <a:p>
             <a:r>
-              <a:rPr lang="pt-PT" b="1" dirty="0">
+              <a:rPr lang="en-US" b="1" dirty="0">
                 <a:latin typeface="Times New Roman" panose="02020603050405020304" pitchFamily="18" charset="0"/>
                 <a:ea typeface="MS Mincho" panose="02020609040205080304" pitchFamily="49" charset="-128"/>
               </a:rPr>
-              <a:t>Data </a:t>
-            </a:r>
-            <a:r>
-              <a:rPr lang="pt-PT" b="1" dirty="0" err="1">
-                <a:latin typeface="Times New Roman" panose="02020603050405020304" pitchFamily="18" charset="0"/>
-                <a:ea typeface="MS Mincho" panose="02020609040205080304" pitchFamily="49" charset="-128"/>
-              </a:rPr>
-              <a:t>Analysis</a:t>
-            </a:r>
-            <a:r>
-              <a:rPr lang="pt-PT" b="1" dirty="0">
-                <a:latin typeface="Times New Roman" panose="02020603050405020304" pitchFamily="18" charset="0"/>
-                <a:ea typeface="MS Mincho" panose="02020609040205080304" pitchFamily="49" charset="-128"/>
-              </a:rPr>
-              <a:t> - </a:t>
-            </a:r>
-            <a:r>
-              <a:rPr lang="pt-PT" b="1" dirty="0" err="1">
-                <a:latin typeface="Times New Roman" panose="02020603050405020304" pitchFamily="18" charset="0"/>
-                <a:ea typeface="MS Mincho" panose="02020609040205080304" pitchFamily="49" charset="-128"/>
-              </a:rPr>
-              <a:t>Energy</a:t>
-            </a:r>
-            <a:endParaRPr lang="pt-PT" dirty="0"/>
+              <a:t>Data Analysis - Energy</a:t>
+            </a:r>
+            <a:endParaRPr lang="en-US" dirty="0"/>
           </a:p>
         </p:txBody>
       </p:sp>
@@ -11611,34 +11130,13 @@
           <a:lstStyle/>
           <a:p>
             <a:r>
-              <a:rPr lang="pt-PT" b="1" dirty="0">
+              <a:rPr lang="en-US" b="1" dirty="0">
                 <a:latin typeface="Times New Roman" panose="02020603050405020304" pitchFamily="18" charset="0"/>
                 <a:ea typeface="MS Mincho" panose="02020609040205080304" pitchFamily="49" charset="-128"/>
               </a:rPr>
-              <a:t>Data </a:t>
-            </a:r>
-            <a:r>
-              <a:rPr lang="pt-PT" b="1" dirty="0" err="1">
-                <a:latin typeface="Times New Roman" panose="02020603050405020304" pitchFamily="18" charset="0"/>
-                <a:ea typeface="MS Mincho" panose="02020609040205080304" pitchFamily="49" charset="-128"/>
-              </a:rPr>
-              <a:t>Analysis</a:t>
-            </a:r>
-            <a:r>
-              <a:rPr lang="pt-PT" b="1" dirty="0">
-                <a:latin typeface="Times New Roman" panose="02020603050405020304" pitchFamily="18" charset="0"/>
-                <a:ea typeface="MS Mincho" panose="02020609040205080304" pitchFamily="49" charset="-128"/>
-              </a:rPr>
-              <a:t> - </a:t>
-            </a:r>
-            <a:r>
-              <a:rPr lang="pt-PT" b="1" dirty="0" err="1">
-                <a:latin typeface="Times New Roman" panose="02020603050405020304" pitchFamily="18" charset="0"/>
-                <a:ea typeface="MS Mincho" panose="02020609040205080304" pitchFamily="49" charset="-128"/>
-              </a:rPr>
-              <a:t>Weather</a:t>
-            </a:r>
-            <a:endParaRPr lang="pt-PT" dirty="0"/>
+              <a:t>Data Analysis - Weather</a:t>
+            </a:r>
+            <a:endParaRPr lang="en-US" dirty="0"/>
           </a:p>
         </p:txBody>
       </p:sp>
@@ -11777,58 +11275,15 @@
           <a:lstStyle/>
           <a:p>
             <a:r>
-              <a:rPr lang="pt-PT" b="1" dirty="0" err="1">
+              <a:rPr lang="en-US" b="1" dirty="0">
                 <a:latin typeface="Times New Roman" panose="02020603050405020304" pitchFamily="18" charset="0"/>
                 <a:ea typeface="MS Mincho" panose="02020609040205080304" pitchFamily="49" charset="-128"/>
               </a:rPr>
-              <a:t>Metholagy</a:t>
-            </a:r>
-            <a:r>
-              <a:rPr lang="pt-PT" b="1" dirty="0">
-                <a:latin typeface="Times New Roman" panose="02020603050405020304" pitchFamily="18" charset="0"/>
-                <a:ea typeface="MS Mincho" panose="02020609040205080304" pitchFamily="49" charset="-128"/>
-              </a:rPr>
-              <a:t> for </a:t>
-            </a:r>
-            <a:r>
-              <a:rPr lang="pt-PT" b="1" dirty="0" err="1">
-                <a:latin typeface="Times New Roman" panose="02020603050405020304" pitchFamily="18" charset="0"/>
-                <a:ea typeface="MS Mincho" panose="02020609040205080304" pitchFamily="49" charset="-128"/>
-              </a:rPr>
-              <a:t>Model</a:t>
-            </a:r>
-            <a:r>
-              <a:rPr lang="pt-PT" b="1" dirty="0">
-                <a:latin typeface="Times New Roman" panose="02020603050405020304" pitchFamily="18" charset="0"/>
-                <a:ea typeface="MS Mincho" panose="02020609040205080304" pitchFamily="49" charset="-128"/>
-              </a:rPr>
-              <a:t> </a:t>
-            </a:r>
-            <a:r>
-              <a:rPr lang="pt-PT" b="1" dirty="0" err="1">
-                <a:latin typeface="Times New Roman" panose="02020603050405020304" pitchFamily="18" charset="0"/>
-                <a:ea typeface="MS Mincho" panose="02020609040205080304" pitchFamily="49" charset="-128"/>
-              </a:rPr>
-              <a:t>processing</a:t>
-            </a:r>
-            <a:r>
-              <a:rPr lang="pt-PT" b="1" dirty="0">
-                <a:latin typeface="Times New Roman" panose="02020603050405020304" pitchFamily="18" charset="0"/>
-                <a:ea typeface="MS Mincho" panose="02020609040205080304" pitchFamily="49" charset="-128"/>
-              </a:rPr>
-              <a:t> </a:t>
-            </a:r>
-            <a:r>
-              <a:rPr lang="pt-PT" dirty="0"/>
-              <a:t>(</a:t>
-            </a:r>
-            <a:r>
-              <a:rPr lang="pt-PT" dirty="0" err="1"/>
-              <a:t>Energy</a:t>
-            </a:r>
-            <a:r>
-              <a:rPr lang="pt-PT" dirty="0"/>
-              <a:t>)</a:t>
+              <a:t>Methodology for Model processing </a:t>
+            </a:r>
+            <a:r>
+              <a:rPr lang="en-US" dirty="0"/>
+              <a:t>(Energy)</a:t>
             </a:r>
           </a:p>
         </p:txBody>
@@ -12179,58 +11634,15 @@
           <a:lstStyle/>
           <a:p>
             <a:r>
-              <a:rPr lang="pt-PT" b="1" dirty="0" err="1">
+              <a:rPr lang="en-US" b="1" dirty="0">
                 <a:latin typeface="Times New Roman" panose="02020603050405020304" pitchFamily="18" charset="0"/>
                 <a:ea typeface="MS Mincho" panose="02020609040205080304" pitchFamily="49" charset="-128"/>
               </a:rPr>
-              <a:t>Metholagy</a:t>
-            </a:r>
-            <a:r>
-              <a:rPr lang="pt-PT" b="1" dirty="0">
-                <a:latin typeface="Times New Roman" panose="02020603050405020304" pitchFamily="18" charset="0"/>
-                <a:ea typeface="MS Mincho" panose="02020609040205080304" pitchFamily="49" charset="-128"/>
-              </a:rPr>
-              <a:t> for </a:t>
-            </a:r>
-            <a:r>
-              <a:rPr lang="pt-PT" b="1" dirty="0" err="1">
-                <a:latin typeface="Times New Roman" panose="02020603050405020304" pitchFamily="18" charset="0"/>
-                <a:ea typeface="MS Mincho" panose="02020609040205080304" pitchFamily="49" charset="-128"/>
-              </a:rPr>
-              <a:t>Model</a:t>
-            </a:r>
-            <a:r>
-              <a:rPr lang="pt-PT" b="1" dirty="0">
-                <a:latin typeface="Times New Roman" panose="02020603050405020304" pitchFamily="18" charset="0"/>
-                <a:ea typeface="MS Mincho" panose="02020609040205080304" pitchFamily="49" charset="-128"/>
-              </a:rPr>
-              <a:t> </a:t>
-            </a:r>
-            <a:r>
-              <a:rPr lang="pt-PT" b="1" dirty="0" err="1">
-                <a:latin typeface="Times New Roman" panose="02020603050405020304" pitchFamily="18" charset="0"/>
-                <a:ea typeface="MS Mincho" panose="02020609040205080304" pitchFamily="49" charset="-128"/>
-              </a:rPr>
-              <a:t>processing</a:t>
-            </a:r>
-            <a:r>
-              <a:rPr lang="pt-PT" b="1" dirty="0">
-                <a:latin typeface="Times New Roman" panose="02020603050405020304" pitchFamily="18" charset="0"/>
-                <a:ea typeface="MS Mincho" panose="02020609040205080304" pitchFamily="49" charset="-128"/>
-              </a:rPr>
-              <a:t> </a:t>
-            </a:r>
-            <a:r>
-              <a:rPr lang="pt-PT" dirty="0"/>
-              <a:t>(</a:t>
-            </a:r>
-            <a:r>
-              <a:rPr lang="pt-PT" dirty="0" err="1"/>
-              <a:t>Weather</a:t>
-            </a:r>
-            <a:r>
-              <a:rPr lang="pt-PT" dirty="0"/>
-              <a:t>)</a:t>
+              <a:t>Methodology for Model processing </a:t>
+            </a:r>
+            <a:r>
+              <a:rPr lang="en-US" dirty="0"/>
+              <a:t>(Weather)</a:t>
             </a:r>
           </a:p>
         </p:txBody>
@@ -12615,28 +12027,14 @@
           </a:lstStyle>
           <a:p>
             <a:r>
-              <a:rPr lang="pt-PT" b="1" dirty="0">
+              <a:rPr lang="en-US" b="1" dirty="0">
                 <a:latin typeface="Times New Roman" panose="02020603050405020304" pitchFamily="18" charset="0"/>
                 <a:ea typeface="MS Mincho" panose="02020609040205080304" pitchFamily="49" charset="-128"/>
               </a:rPr>
-              <a:t>Data </a:t>
-            </a:r>
-            <a:r>
-              <a:rPr lang="pt-PT" b="1" dirty="0" err="1">
-                <a:latin typeface="Times New Roman" panose="02020603050405020304" pitchFamily="18" charset="0"/>
-                <a:ea typeface="MS Mincho" panose="02020609040205080304" pitchFamily="49" charset="-128"/>
-              </a:rPr>
-              <a:t>Interpretation</a:t>
-            </a:r>
-            <a:r>
-              <a:rPr lang="pt-PT" b="1" dirty="0">
-                <a:latin typeface="Times New Roman" panose="02020603050405020304" pitchFamily="18" charset="0"/>
-                <a:ea typeface="MS Mincho" panose="02020609040205080304" pitchFamily="49" charset="-128"/>
-              </a:rPr>
-              <a:t> </a:t>
-            </a:r>
-            <a:r>
-              <a:rPr lang="pt-PT" sz="4000" dirty="0">
+              <a:t>Data Interpretation </a:t>
+            </a:r>
+            <a:r>
+              <a:rPr lang="en-US" sz="4000" dirty="0">
                 <a:latin typeface="Tahoma" panose="020B0604030504040204" pitchFamily="34" charset="0"/>
                 <a:ea typeface="Tahoma" panose="020B0604030504040204" pitchFamily="34" charset="0"/>
                 <a:cs typeface="Tahoma" panose="020B0604030504040204" pitchFamily="34" charset="0"/>
@@ -12847,97 +12245,16 @@
           <a:p>
             <a:pPr lvl="1" algn="just"/>
             <a:r>
-              <a:rPr lang="pt-PT" dirty="0"/>
-              <a:t>9504 </a:t>
-            </a:r>
-            <a:r>
-              <a:rPr lang="pt-PT" dirty="0" err="1"/>
-              <a:t>instances</a:t>
-            </a:r>
-            <a:r>
-              <a:rPr lang="pt-PT" dirty="0"/>
-              <a:t> </a:t>
-            </a:r>
-            <a:r>
-              <a:rPr lang="pt-PT" dirty="0" err="1"/>
-              <a:t>with</a:t>
-            </a:r>
-            <a:r>
-              <a:rPr lang="pt-PT" dirty="0"/>
-              <a:t> 24 features</a:t>
+              <a:rPr lang="en-US" dirty="0"/>
+              <a:t>9504 instances with 24 features</a:t>
             </a:r>
           </a:p>
           <a:p>
             <a:pPr lvl="1" algn="just"/>
             <a:r>
-              <a:rPr lang="pt-PT" dirty="0" err="1"/>
-              <a:t>Imputation</a:t>
-            </a:r>
-            <a:r>
-              <a:rPr lang="pt-PT" dirty="0"/>
-              <a:t> </a:t>
-            </a:r>
-            <a:r>
-              <a:rPr lang="pt-PT" dirty="0" err="1"/>
-              <a:t>based</a:t>
-            </a:r>
-            <a:r>
-              <a:rPr lang="pt-PT" dirty="0"/>
-              <a:t> </a:t>
-            </a:r>
-            <a:r>
-              <a:rPr lang="pt-PT" dirty="0" err="1"/>
-              <a:t>on</a:t>
-            </a:r>
-            <a:r>
-              <a:rPr lang="pt-PT" dirty="0"/>
-              <a:t> </a:t>
-            </a:r>
-            <a:r>
-              <a:rPr lang="pt-PT" dirty="0" err="1"/>
-              <a:t>median</a:t>
-            </a:r>
-            <a:r>
-              <a:rPr lang="pt-PT" dirty="0"/>
-              <a:t>, mean, </a:t>
-            </a:r>
-            <a:r>
-              <a:rPr lang="pt-PT" dirty="0" err="1"/>
-              <a:t>or</a:t>
-            </a:r>
-            <a:r>
-              <a:rPr lang="pt-PT" dirty="0"/>
-              <a:t> zero, </a:t>
-            </a:r>
-            <a:r>
-              <a:rPr lang="pt-PT" dirty="0" err="1"/>
-              <a:t>given</a:t>
-            </a:r>
-            <a:r>
-              <a:rPr lang="pt-PT" dirty="0"/>
-              <a:t> standard </a:t>
-            </a:r>
-            <a:r>
-              <a:rPr lang="pt-PT" dirty="0" err="1"/>
-              <a:t>deviation</a:t>
-            </a:r>
-            <a:r>
-              <a:rPr lang="pt-PT" dirty="0"/>
-              <a:t> </a:t>
-            </a:r>
-            <a:r>
-              <a:rPr lang="pt-PT" dirty="0" err="1"/>
-              <a:t>of</a:t>
-            </a:r>
-            <a:r>
-              <a:rPr lang="pt-PT" dirty="0"/>
-              <a:t> original </a:t>
-            </a:r>
-            <a:r>
-              <a:rPr lang="pt-PT" dirty="0" err="1"/>
-              <a:t>values</a:t>
-            </a:r>
-            <a:endParaRPr lang="pt-PT" dirty="0"/>
+              <a:rPr lang="en-US" dirty="0"/>
+              <a:t>Imputation based on median, mean, or zero, given standard deviation of original values</a:t>
+            </a:r>
           </a:p>
           <a:p>
             <a:pPr lvl="1"/>

</xml_diff>